<commit_message>
Correct thrown exception name
</commit_message>
<xml_diff>
--- a/docs/media/cheat-sheet-rate-limiter.pptx
+++ b/docs/media/cheat-sheet-rate-limiter.pptx
@@ -3315,15 +3315,38 @@
                 <a:latin typeface="Source Sans Pro" panose="020B0503030403020204" pitchFamily="34" charset="0"/>
                 <a:ea typeface="Source Sans Pro" panose="020B0503030403020204" pitchFamily="34" charset="0"/>
               </a:rPr>
-              <a:t>If the predefined threshold is exceeded, then the strategy will throw </a:t>
-            </a:r>
-            <a:r>
-              <a:rPr lang="en-GB" sz="1600" dirty="0" err="1">
+              <a:t>If the predefined threshold is exceeded, </a:t>
+            </a:r>
+            <a:r>
+              <a:rPr lang="en-GB" sz="1600" b="0">
                 <a:effectLst/>
                 <a:latin typeface="Source Sans Pro" panose="020B0503030403020204" pitchFamily="34" charset="0"/>
                 <a:ea typeface="Source Sans Pro" panose="020B0503030403020204" pitchFamily="34" charset="0"/>
               </a:rPr>
-              <a:t>RateLimitRejectedException</a:t>
+              <a:t>then </a:t>
+            </a:r>
+            <a:r>
+              <a:rPr lang="en-GB" sz="1600" b="0">
+                <a:latin typeface="Source Sans Pro" panose="020B0503030403020204" pitchFamily="34" charset="0"/>
+                <a:ea typeface="Source Sans Pro" panose="020B0503030403020204" pitchFamily="34" charset="0"/>
+              </a:rPr>
+              <a:t>it</a:t>
+            </a:r>
+            <a:r>
+              <a:rPr lang="en-GB" sz="1600" b="0">
+                <a:effectLst/>
+                <a:latin typeface="Source Sans Pro" panose="020B0503030403020204" pitchFamily="34" charset="0"/>
+                <a:ea typeface="Source Sans Pro" panose="020B0503030403020204" pitchFamily="34" charset="0"/>
+              </a:rPr>
+              <a:t> will throw an </a:t>
+            </a:r>
+            <a:r>
+              <a:rPr lang="en-GB" sz="1600" dirty="0" err="1">
+                <a:effectLst/>
+                <a:latin typeface="Source Sans Pro" panose="020B0503030403020204" pitchFamily="34" charset="0"/>
+                <a:ea typeface="Source Sans Pro" panose="020B0503030403020204" pitchFamily="34" charset="0"/>
+              </a:rPr>
+              <a:t>RateLimiterRejectedException</a:t>
             </a:r>
             <a:r>
               <a:rPr lang="en-GB" sz="1600" b="0" dirty="0">

</xml_diff>

<commit_message>
Apply suggestions based on feedback
</commit_message>
<xml_diff>
--- a/docs/media/cheat-sheet-rate-limiter.pptx
+++ b/docs/media/cheat-sheet-rate-limiter.pptx
@@ -3315,25 +3315,17 @@
                 <a:latin typeface="Source Sans Pro" panose="020B0503030403020204" pitchFamily="34" charset="0"/>
                 <a:ea typeface="Source Sans Pro" panose="020B0503030403020204" pitchFamily="34" charset="0"/>
               </a:rPr>
-              <a:t>If the predefined threshold is exceeded, </a:t>
-            </a:r>
-            <a:r>
-              <a:rPr lang="en-GB" sz="1600" b="0">
-                <a:effectLst/>
+              <a:t>If the predefined threshold is exceeded, then </a:t>
+            </a:r>
+            <a:r>
+              <a:rPr lang="en-GB" sz="1600" b="0" dirty="0">
                 <a:latin typeface="Source Sans Pro" panose="020B0503030403020204" pitchFamily="34" charset="0"/>
                 <a:ea typeface="Source Sans Pro" panose="020B0503030403020204" pitchFamily="34" charset="0"/>
               </a:rPr>
-              <a:t>then </a:t>
-            </a:r>
-            <a:r>
-              <a:rPr lang="en-GB" sz="1600" b="0">
-                <a:latin typeface="Source Sans Pro" panose="020B0503030403020204" pitchFamily="34" charset="0"/>
-                <a:ea typeface="Source Sans Pro" panose="020B0503030403020204" pitchFamily="34" charset="0"/>
-              </a:rPr>
               <a:t>it</a:t>
             </a:r>
             <a:r>
-              <a:rPr lang="en-GB" sz="1600" b="0">
+              <a:rPr lang="en-GB" sz="1600" b="0" dirty="0">
                 <a:effectLst/>
                 <a:latin typeface="Source Sans Pro" panose="020B0503030403020204" pitchFamily="34" charset="0"/>
                 <a:ea typeface="Source Sans Pro" panose="020B0503030403020204" pitchFamily="34" charset="0"/>
@@ -3369,7 +3361,7 @@
                 <a:latin typeface="Source Sans Pro" panose="020B0503030403020204" pitchFamily="34" charset="0"/>
                 <a:ea typeface="Source Sans Pro" panose="020B0503030403020204" pitchFamily="34" charset="0"/>
               </a:rPr>
-              <a:t>Use the rate limiter to limit the incoming requests during a given period (also called as </a:t>
+              <a:t>Use the rate limiter to limit the incoming requests during a given period (also called a </a:t>
             </a:r>
             <a:r>
               <a:rPr lang="en-GB" sz="1600" b="0" i="1" dirty="0">
@@ -3417,11 +3409,18 @@
               <a:t>System.Threading.RateLimiting</a:t>
             </a:r>
             <a:r>
+              <a:rPr lang="en-GB" sz="1600" dirty="0">
+                <a:latin typeface="Source Sans Pro" panose="020B0503030403020204" pitchFamily="34" charset="0"/>
+                <a:ea typeface="Source Sans Pro" panose="020B0503030403020204" pitchFamily="34" charset="0"/>
+              </a:rPr>
+              <a:t> </a:t>
+            </a:r>
+            <a:r>
               <a:rPr lang="en-GB" sz="1600" b="0" dirty="0">
                 <a:latin typeface="Source Sans Pro" panose="020B0503030403020204" pitchFamily="34" charset="0"/>
                 <a:ea typeface="Source Sans Pro" panose="020B0503030403020204" pitchFamily="34" charset="0"/>
               </a:rPr>
-              <a:t>. Check out the </a:t>
+              <a:t>APIs. Check out this </a:t>
             </a:r>
             <a:r>
               <a:rPr lang="en-GB" sz="1600" b="0" dirty="0">
@@ -3429,7 +3428,7 @@
                 <a:ea typeface="Source Sans Pro" panose="020B0503030403020204" pitchFamily="34" charset="0"/>
                 <a:hlinkClick r:id="rId2"/>
               </a:rPr>
-              <a:t>announcement article</a:t>
+              <a:t>article</a:t>
             </a:r>
             <a:r>
               <a:rPr lang="en-GB" sz="1600" b="0" dirty="0">
@@ -3466,7 +3465,21 @@
                 <a:latin typeface="Source Sans Pro" panose="020B0503030403020204" pitchFamily="34" charset="0"/>
                 <a:ea typeface="Source Sans Pro" panose="020B0503030403020204" pitchFamily="34" charset="0"/>
               </a:rPr>
-              <a:t> package to your solution to be able to use this strategy.</a:t>
+              <a:t> package to </a:t>
+            </a:r>
+            <a:r>
+              <a:rPr lang="en-GB" sz="1600" b="0">
+                <a:latin typeface="Source Sans Pro" panose="020B0503030403020204" pitchFamily="34" charset="0"/>
+                <a:ea typeface="Source Sans Pro" panose="020B0503030403020204" pitchFamily="34" charset="0"/>
+              </a:rPr>
+              <a:t>your project </a:t>
+            </a:r>
+            <a:r>
+              <a:rPr lang="en-GB" sz="1600" b="0" dirty="0">
+                <a:latin typeface="Source Sans Pro" panose="020B0503030403020204" pitchFamily="34" charset="0"/>
+                <a:ea typeface="Source Sans Pro" panose="020B0503030403020204" pitchFamily="34" charset="0"/>
+              </a:rPr>
+              <a:t>to be able to use this strategy.</a:t>
             </a:r>
           </a:p>
         </p:txBody>

</xml_diff>